<commit_message>
Added part 2 slides to presentation
</commit_message>
<xml_diff>
--- a/Presentation.pptx
+++ b/Presentation.pptx
@@ -118,6 +118,11 @@
       </a:defRPr>
     </a:lvl9pPr>
   </p:defaultTextStyle>
+  <p:extLst>
+    <p:ext uri="{EFAFB233-063F-42B5-8137-9DF3F51BA10A}">
+      <p15:sldGuideLst xmlns:p15="http://schemas.microsoft.com/office/powerpoint/2012/main"/>
+    </p:ext>
+  </p:extLst>
 </p:presentation>
 </file>
 
@@ -203,7 +208,7 @@
           <a:p>
             <a:fld id="{6CA199C2-D0FB-8B45-B678-EF2FF5086A3C}" type="datetimeFigureOut">
               <a:rPr lang="en-US" smtClean="0"/>
-              <a:t>11/24/15</a:t>
+              <a:t>11/24/2015</a:t>
             </a:fld>
             <a:endParaRPr lang="en-US"/>
           </a:p>
@@ -1378,7 +1383,7 @@
           <a:p>
             <a:fld id="{4BDF68E2-58F2-4D09-BE8B-E3BD06533059}" type="datetimeFigureOut">
               <a:rPr lang="en-US" dirty="0"/>
-              <a:t>11/23/15</a:t>
+              <a:t>11/24/2015</a:t>
             </a:fld>
             <a:endParaRPr lang="en-US" dirty="0"/>
           </a:p>
@@ -1581,7 +1586,7 @@
           <a:p>
             <a:fld id="{2E2D6473-DF6D-4702-B328-E0DD40540A4E}" type="datetimeFigureOut">
               <a:rPr lang="en-US" dirty="0"/>
-              <a:t>11/23/15</a:t>
+              <a:t>11/24/2015</a:t>
             </a:fld>
             <a:endParaRPr lang="en-US" dirty="0"/>
           </a:p>
@@ -1832,7 +1837,7 @@
           <a:p>
             <a:fld id="{E26F7E3A-B166-407D-9866-32884E7D5B37}" type="datetimeFigureOut">
               <a:rPr lang="en-US" dirty="0"/>
-              <a:t>11/23/15</a:t>
+              <a:t>11/24/2015</a:t>
             </a:fld>
             <a:endParaRPr lang="en-US" dirty="0"/>
           </a:p>
@@ -2001,7 +2006,7 @@
           <a:p>
             <a:fld id="{528FC5F6-F338-4AE4-BB23-26385BCFC423}" type="datetimeFigureOut">
               <a:rPr lang="en-US" dirty="0"/>
-              <a:t>11/23/15</a:t>
+              <a:t>11/24/2015</a:t>
             </a:fld>
             <a:endParaRPr lang="en-US" dirty="0"/>
           </a:p>
@@ -2339,7 +2344,7 @@
           <a:p>
             <a:fld id="{20EBB0C4-6273-4C6E-B9BD-2EDC30F1CD52}" type="datetimeFigureOut">
               <a:rPr lang="en-US" dirty="0"/>
-              <a:t>11/23/15</a:t>
+              <a:t>11/24/2015</a:t>
             </a:fld>
             <a:endParaRPr lang="en-US" dirty="0"/>
           </a:p>
@@ -2609,7 +2614,7 @@
           <a:p>
             <a:fld id="{19AB4D41-86C1-4908-B66A-0B50CEB3BF29}" type="datetimeFigureOut">
               <a:rPr lang="en-US" dirty="0"/>
-              <a:t>11/23/15</a:t>
+              <a:t>11/24/2015</a:t>
             </a:fld>
             <a:endParaRPr lang="en-US" dirty="0"/>
           </a:p>
@@ -2983,7 +2988,7 @@
           <a:p>
             <a:fld id="{E6426E2C-56C1-4E0D-A793-0088A7FDD37E}" type="datetimeFigureOut">
               <a:rPr lang="en-US" dirty="0"/>
-              <a:t>11/23/15</a:t>
+              <a:t>11/24/2015</a:t>
             </a:fld>
             <a:endParaRPr lang="en-US" dirty="0"/>
           </a:p>
@@ -3096,7 +3101,7 @@
           <a:p>
             <a:fld id="{C8C39B41-D8B5-4052-B551-9B5525EAA8B6}" type="datetimeFigureOut">
               <a:rPr lang="en-US" dirty="0"/>
-              <a:t>11/23/15</a:t>
+              <a:t>11/24/2015</a:t>
             </a:fld>
             <a:endParaRPr lang="en-US" dirty="0"/>
           </a:p>
@@ -3262,7 +3267,7 @@
           <a:p>
             <a:fld id="{4D94136C-8742-45B2-AF27-D93DF72833A9}" type="datetimeFigureOut">
               <a:rPr lang="en-US" dirty="0"/>
-              <a:t>11/23/15</a:t>
+              <a:t>11/24/2015</a:t>
             </a:fld>
             <a:endParaRPr lang="en-US" dirty="0"/>
           </a:p>
@@ -3612,7 +3617,7 @@
           <a:p>
             <a:fld id="{32ABBEA6-7C60-4B02-AE87-00D78D8422AF}" type="datetimeFigureOut">
               <a:rPr lang="en-US" dirty="0"/>
-              <a:t>11/23/15</a:t>
+              <a:t>11/24/2015</a:t>
             </a:fld>
             <a:endParaRPr lang="en-US" dirty="0"/>
           </a:p>
@@ -3990,7 +3995,7 @@
           <a:p>
             <a:fld id="{C9CAD897-D46E-4AD2-BD9B-49DD3E640873}" type="datetimeFigureOut">
               <a:rPr lang="en-US" dirty="0"/>
-              <a:t>11/23/15</a:t>
+              <a:t>11/24/2015</a:t>
             </a:fld>
             <a:endParaRPr lang="en-US" dirty="0"/>
           </a:p>
@@ -4272,7 +4277,7 @@
           <a:p>
             <a:fld id="{98624D31-43A5-475A-80CF-332C9F6DCF35}" type="datetimeFigureOut">
               <a:rPr lang="en-US" dirty="0"/>
-              <a:t>11/23/15</a:t>
+              <a:t>11/24/2015</a:t>
             </a:fld>
             <a:endParaRPr lang="en-US" dirty="0"/>
           </a:p>
@@ -4915,6 +4920,65 @@
           <a:chExt cx="0" cy="0"/>
         </a:xfrm>
       </p:grpSpPr>
+      <p:pic>
+        <p:nvPicPr>
+          <p:cNvPr id="2" name="Picture 1"/>
+          <p:cNvPicPr>
+            <a:picLocks noChangeAspect="1"/>
+          </p:cNvPicPr>
+          <p:nvPr/>
+        </p:nvPicPr>
+        <p:blipFill>
+          <a:blip r:embed="rId3"/>
+          <a:stretch>
+            <a:fillRect/>
+          </a:stretch>
+        </p:blipFill>
+        <p:spPr>
+          <a:xfrm>
+            <a:off x="587291" y="1914274"/>
+            <a:ext cx="11111455" cy="3572127"/>
+          </a:xfrm>
+          <a:prstGeom prst="rect">
+            <a:avLst/>
+          </a:prstGeom>
+        </p:spPr>
+      </p:pic>
+      <p:sp>
+        <p:nvSpPr>
+          <p:cNvPr id="3" name="TextBox 2"/>
+          <p:cNvSpPr txBox="1"/>
+          <p:nvPr/>
+        </p:nvSpPr>
+        <p:spPr>
+          <a:xfrm>
+            <a:off x="1844842" y="449179"/>
+            <a:ext cx="8261684" cy="938719"/>
+          </a:xfrm>
+          <a:prstGeom prst="rect">
+            <a:avLst/>
+          </a:prstGeom>
+          <a:noFill/>
+        </p:spPr>
+        <p:txBody>
+          <a:bodyPr wrap="square" rtlCol="0">
+            <a:spAutoFit/>
+          </a:bodyPr>
+          <a:lstStyle/>
+          <a:p>
+            <a:pPr algn="ctr"/>
+            <a:r>
+              <a:rPr lang="en-US" sz="5500" dirty="0" smtClean="0">
+                <a:latin typeface="+mj-lt"/>
+              </a:rPr>
+              <a:t>Conceptual Model</a:t>
+            </a:r>
+            <a:endParaRPr lang="en-US" sz="5500" dirty="0">
+              <a:latin typeface="+mj-lt"/>
+            </a:endParaRPr>
+          </a:p>
+        </p:txBody>
+      </p:sp>
     </p:spTree>
     <p:extLst>
       <p:ext uri="{BB962C8B-B14F-4D97-AF65-F5344CB8AC3E}">
@@ -4945,6 +5009,89 @@
           <a:chExt cx="0" cy="0"/>
         </a:xfrm>
       </p:grpSpPr>
+      <p:pic>
+        <p:nvPicPr>
+          <p:cNvPr id="2" name="Picture 1"/>
+          <p:cNvPicPr>
+            <a:picLocks noChangeAspect="1"/>
+          </p:cNvPicPr>
+          <p:nvPr/>
+        </p:nvPicPr>
+        <p:blipFill>
+          <a:blip r:embed="rId3"/>
+          <a:stretch>
+            <a:fillRect/>
+          </a:stretch>
+        </p:blipFill>
+        <p:spPr>
+          <a:xfrm>
+            <a:off x="215065" y="1411705"/>
+            <a:ext cx="8672261" cy="4813884"/>
+          </a:xfrm>
+          <a:prstGeom prst="rect">
+            <a:avLst/>
+          </a:prstGeom>
+        </p:spPr>
+      </p:pic>
+      <p:pic>
+        <p:nvPicPr>
+          <p:cNvPr id="3" name="Picture 2"/>
+          <p:cNvPicPr>
+            <a:picLocks noChangeAspect="1"/>
+          </p:cNvPicPr>
+          <p:nvPr/>
+        </p:nvPicPr>
+        <p:blipFill>
+          <a:blip r:embed="rId4"/>
+          <a:stretch>
+            <a:fillRect/>
+          </a:stretch>
+        </p:blipFill>
+        <p:spPr>
+          <a:xfrm>
+            <a:off x="8999621" y="2462463"/>
+            <a:ext cx="3064041" cy="2101516"/>
+          </a:xfrm>
+          <a:prstGeom prst="rect">
+            <a:avLst/>
+          </a:prstGeom>
+        </p:spPr>
+      </p:pic>
+      <p:sp>
+        <p:nvSpPr>
+          <p:cNvPr id="4" name="TextBox 3"/>
+          <p:cNvSpPr txBox="1"/>
+          <p:nvPr/>
+        </p:nvSpPr>
+        <p:spPr>
+          <a:xfrm>
+            <a:off x="1636295" y="352926"/>
+            <a:ext cx="8758989" cy="830997"/>
+          </a:xfrm>
+          <a:prstGeom prst="rect">
+            <a:avLst/>
+          </a:prstGeom>
+          <a:noFill/>
+        </p:spPr>
+        <p:txBody>
+          <a:bodyPr wrap="square" rtlCol="0">
+            <a:spAutoFit/>
+          </a:bodyPr>
+          <a:lstStyle/>
+          <a:p>
+            <a:pPr algn="ctr"/>
+            <a:r>
+              <a:rPr lang="en-US" sz="4800" dirty="0" smtClean="0">
+                <a:latin typeface="+mj-lt"/>
+              </a:rPr>
+              <a:t>Mobile Application </a:t>
+            </a:r>
+            <a:endParaRPr lang="en-US" sz="4800" dirty="0">
+              <a:latin typeface="+mj-lt"/>
+            </a:endParaRPr>
+          </a:p>
+        </p:txBody>
+      </p:sp>
     </p:spTree>
     <p:extLst>
       <p:ext uri="{BB962C8B-B14F-4D97-AF65-F5344CB8AC3E}">

</xml_diff>